<commit_message>
Update 新建 Microsoft PowerPoint 演示文稿.pptx
</commit_message>
<xml_diff>
--- a/新建 Microsoft PowerPoint 演示文稿.pptx
+++ b/新建 Microsoft PowerPoint 演示文稿.pptx
@@ -7,8 +7,9 @@
   <p:sldIdLst>
     <p:sldId id="256" r:id="rId2"/>
     <p:sldId id="257" r:id="rId3"/>
-    <p:sldId id="258" r:id="rId4"/>
-    <p:sldId id="259" r:id="rId5"/>
+    <p:sldId id="260" r:id="rId4"/>
+    <p:sldId id="258" r:id="rId5"/>
+    <p:sldId id="259" r:id="rId6"/>
   </p:sldIdLst>
   <p:sldSz cx="12192000" cy="6858000"/>
   <p:notesSz cx="6858000" cy="9144000"/>
@@ -125,6 +126,148 @@
 
 <file path=ppt/changesInfos/changesInfo1.xml><?xml version="1.0" encoding="utf-8"?>
 <pc:chgInfo xmlns:a="http://schemas.openxmlformats.org/drawingml/2006/main" xmlns:r="http://schemas.openxmlformats.org/officeDocument/2006/relationships" xmlns:ac="http://schemas.microsoft.com/office/drawing/2013/main/command" xmlns:pc="http://schemas.microsoft.com/office/powerpoint/2013/main/command">
+  <pc:docChgLst>
+    <pc:chgData name="0308 Phantom" userId="d189c7b077a883f0" providerId="LiveId" clId="{CCB372FA-C8CD-4060-9A70-83504401E0E3}"/>
+    <pc:docChg chg="undo custSel addSld modSld">
+      <pc:chgData name="0308 Phantom" userId="d189c7b077a883f0" providerId="LiveId" clId="{CCB372FA-C8CD-4060-9A70-83504401E0E3}" dt="2019-03-30T11:35:36.754" v="352" actId="1076"/>
+      <pc:docMkLst>
+        <pc:docMk/>
+      </pc:docMkLst>
+      <pc:sldChg chg="modSp">
+        <pc:chgData name="0308 Phantom" userId="d189c7b077a883f0" providerId="LiveId" clId="{CCB372FA-C8CD-4060-9A70-83504401E0E3}" dt="2019-03-30T11:20:40.555" v="35" actId="20577"/>
+        <pc:sldMkLst>
+          <pc:docMk/>
+          <pc:sldMk cId="1335850902" sldId="257"/>
+        </pc:sldMkLst>
+        <pc:spChg chg="mod">
+          <ac:chgData name="0308 Phantom" userId="d189c7b077a883f0" providerId="LiveId" clId="{CCB372FA-C8CD-4060-9A70-83504401E0E3}" dt="2019-03-30T11:20:40.555" v="35" actId="20577"/>
+          <ac:spMkLst>
+            <pc:docMk/>
+            <pc:sldMk cId="1335850902" sldId="257"/>
+            <ac:spMk id="2" creationId="{8A5AEDBD-79FD-45D0-AC2D-A7D67795A937}"/>
+          </ac:spMkLst>
+        </pc:spChg>
+      </pc:sldChg>
+      <pc:sldChg chg="addSp delSp modSp">
+        <pc:chgData name="0308 Phantom" userId="d189c7b077a883f0" providerId="LiveId" clId="{CCB372FA-C8CD-4060-9A70-83504401E0E3}" dt="2019-03-30T11:35:36.754" v="352" actId="1076"/>
+        <pc:sldMkLst>
+          <pc:docMk/>
+          <pc:sldMk cId="2194792377" sldId="258"/>
+        </pc:sldMkLst>
+        <pc:spChg chg="add del mod">
+          <ac:chgData name="0308 Phantom" userId="d189c7b077a883f0" providerId="LiveId" clId="{CCB372FA-C8CD-4060-9A70-83504401E0E3}" dt="2019-03-30T11:19:26.043" v="1" actId="11529"/>
+          <ac:spMkLst>
+            <pc:docMk/>
+            <pc:sldMk cId="2194792377" sldId="258"/>
+            <ac:spMk id="2" creationId="{D219BFB0-B4AD-4664-8A77-5CF6BCCBD27F}"/>
+          </ac:spMkLst>
+        </pc:spChg>
+        <pc:spChg chg="add mod">
+          <ac:chgData name="0308 Phantom" userId="d189c7b077a883f0" providerId="LiveId" clId="{CCB372FA-C8CD-4060-9A70-83504401E0E3}" dt="2019-03-30T11:33:00.385" v="314" actId="1076"/>
+          <ac:spMkLst>
+            <pc:docMk/>
+            <pc:sldMk cId="2194792377" sldId="258"/>
+            <ac:spMk id="3" creationId="{B3025546-DE5E-4A37-8338-C9DA955E2C39}"/>
+          </ac:spMkLst>
+        </pc:spChg>
+        <pc:spChg chg="mod">
+          <ac:chgData name="0308 Phantom" userId="d189c7b077a883f0" providerId="LiveId" clId="{CCB372FA-C8CD-4060-9A70-83504401E0E3}" dt="2019-03-30T11:33:00.385" v="314" actId="1076"/>
+          <ac:spMkLst>
+            <pc:docMk/>
+            <pc:sldMk cId="2194792377" sldId="258"/>
+            <ac:spMk id="4" creationId="{D987FEA8-A4A3-43C4-911D-4533CFF13574}"/>
+          </ac:spMkLst>
+        </pc:spChg>
+        <pc:spChg chg="mod">
+          <ac:chgData name="0308 Phantom" userId="d189c7b077a883f0" providerId="LiveId" clId="{CCB372FA-C8CD-4060-9A70-83504401E0E3}" dt="2019-03-30T11:35:12.402" v="326" actId="14100"/>
+          <ac:spMkLst>
+            <pc:docMk/>
+            <pc:sldMk cId="2194792377" sldId="258"/>
+            <ac:spMk id="5" creationId="{1930E1DC-E711-4C0C-A966-6923D29141DA}"/>
+          </ac:spMkLst>
+        </pc:spChg>
+        <pc:spChg chg="mod">
+          <ac:chgData name="0308 Phantom" userId="d189c7b077a883f0" providerId="LiveId" clId="{CCB372FA-C8CD-4060-9A70-83504401E0E3}" dt="2019-03-30T11:35:05.337" v="323" actId="1076"/>
+          <ac:spMkLst>
+            <pc:docMk/>
+            <pc:sldMk cId="2194792377" sldId="258"/>
+            <ac:spMk id="6" creationId="{611EE75B-7015-41E7-AF82-A207B52C80C0}"/>
+          </ac:spMkLst>
+        </pc:spChg>
+        <pc:spChg chg="mod">
+          <ac:chgData name="0308 Phantom" userId="d189c7b077a883f0" providerId="LiveId" clId="{CCB372FA-C8CD-4060-9A70-83504401E0E3}" dt="2019-03-30T11:33:00.385" v="314" actId="1076"/>
+          <ac:spMkLst>
+            <pc:docMk/>
+            <pc:sldMk cId="2194792377" sldId="258"/>
+            <ac:spMk id="7" creationId="{190FB00E-B36D-4834-AECF-DEAC74272CC9}"/>
+          </ac:spMkLst>
+        </pc:spChg>
+        <pc:spChg chg="add mod">
+          <ac:chgData name="0308 Phantom" userId="d189c7b077a883f0" providerId="LiveId" clId="{CCB372FA-C8CD-4060-9A70-83504401E0E3}" dt="2019-03-30T11:35:07.337" v="324" actId="14100"/>
+          <ac:spMkLst>
+            <pc:docMk/>
+            <pc:sldMk cId="2194792377" sldId="258"/>
+            <ac:spMk id="8" creationId="{427CFD1E-EF76-407E-A643-90804EDC230D}"/>
+          </ac:spMkLst>
+        </pc:spChg>
+        <pc:spChg chg="add mod">
+          <ac:chgData name="0308 Phantom" userId="d189c7b077a883f0" providerId="LiveId" clId="{CCB372FA-C8CD-4060-9A70-83504401E0E3}" dt="2019-03-30T11:35:15.226" v="327" actId="1076"/>
+          <ac:spMkLst>
+            <pc:docMk/>
+            <pc:sldMk cId="2194792377" sldId="258"/>
+            <ac:spMk id="9" creationId="{72063762-0460-4A5A-9D9C-EDFCEE9B33A5}"/>
+          </ac:spMkLst>
+        </pc:spChg>
+        <pc:spChg chg="add mod">
+          <ac:chgData name="0308 Phantom" userId="d189c7b077a883f0" providerId="LiveId" clId="{CCB372FA-C8CD-4060-9A70-83504401E0E3}" dt="2019-03-30T11:34:54.554" v="318" actId="1076"/>
+          <ac:spMkLst>
+            <pc:docMk/>
+            <pc:sldMk cId="2194792377" sldId="258"/>
+            <ac:spMk id="10" creationId="{E9D3E8BA-BDC9-4BBA-8D62-9E7BC0C8A7DF}"/>
+          </ac:spMkLst>
+        </pc:spChg>
+        <pc:spChg chg="add mod">
+          <ac:chgData name="0308 Phantom" userId="d189c7b077a883f0" providerId="LiveId" clId="{CCB372FA-C8CD-4060-9A70-83504401E0E3}" dt="2019-03-30T11:35:18.873" v="328" actId="1076"/>
+          <ac:spMkLst>
+            <pc:docMk/>
+            <pc:sldMk cId="2194792377" sldId="258"/>
+            <ac:spMk id="11" creationId="{AF805E00-5A50-4960-AF47-4249F6E75D5A}"/>
+          </ac:spMkLst>
+        </pc:spChg>
+        <pc:spChg chg="add mod">
+          <ac:chgData name="0308 Phantom" userId="d189c7b077a883f0" providerId="LiveId" clId="{CCB372FA-C8CD-4060-9A70-83504401E0E3}" dt="2019-03-30T11:35:36.754" v="352" actId="1076"/>
+          <ac:spMkLst>
+            <pc:docMk/>
+            <pc:sldMk cId="2194792377" sldId="258"/>
+            <ac:spMk id="12" creationId="{C0A84DB8-4D11-4745-833E-1D2D42037304}"/>
+          </ac:spMkLst>
+        </pc:spChg>
+      </pc:sldChg>
+      <pc:sldChg chg="modSp add">
+        <pc:chgData name="0308 Phantom" userId="d189c7b077a883f0" providerId="LiveId" clId="{CCB372FA-C8CD-4060-9A70-83504401E0E3}" dt="2019-03-30T11:28:17.403" v="260" actId="6549"/>
+        <pc:sldMkLst>
+          <pc:docMk/>
+          <pc:sldMk cId="2262985119" sldId="260"/>
+        </pc:sldMkLst>
+        <pc:spChg chg="mod">
+          <ac:chgData name="0308 Phantom" userId="d189c7b077a883f0" providerId="LiveId" clId="{CCB372FA-C8CD-4060-9A70-83504401E0E3}" dt="2019-03-30T11:21:48.340" v="46" actId="20577"/>
+          <ac:spMkLst>
+            <pc:docMk/>
+            <pc:sldMk cId="2262985119" sldId="260"/>
+            <ac:spMk id="2" creationId="{CD8C2B35-7236-4B09-AB86-3EF146BBBC19}"/>
+          </ac:spMkLst>
+        </pc:spChg>
+        <pc:spChg chg="mod">
+          <ac:chgData name="0308 Phantom" userId="d189c7b077a883f0" providerId="LiveId" clId="{CCB372FA-C8CD-4060-9A70-83504401E0E3}" dt="2019-03-30T11:28:17.403" v="260" actId="6549"/>
+          <ac:spMkLst>
+            <pc:docMk/>
+            <pc:sldMk cId="2262985119" sldId="260"/>
+            <ac:spMk id="3" creationId="{2B4F8F6E-0F47-423C-A04E-9ADF85EACD9E}"/>
+          </ac:spMkLst>
+        </pc:spChg>
+      </pc:sldChg>
+    </pc:docChg>
+  </pc:docChgLst>
   <pc:docChgLst>
     <pc:chgData name="Keith Lin" userId="e80b64d1f18c4e4d" providerId="Windows Live" clId="Web-{AD990DB8-A0A0-4F21-B84C-E88C90D243EE}"/>
     <pc:docChg chg="modSld">
@@ -3684,22 +3827,10 @@
           <a:lstStyle/>
           <a:p>
             <a:r>
-              <a:rPr lang="en-US" altLang="zh-CN" dirty="0" err="1">
-                <a:ea typeface="等线 Light"/>
-              </a:rPr>
-              <a:t>Linyizhu</a:t>
-            </a:r>
-            <a:r>
               <a:rPr lang="en-US" altLang="zh-CN" dirty="0">
                 <a:ea typeface="等线 Light"/>
               </a:rPr>
-              <a:t> NB</a:t>
-            </a:r>
-            <a:r>
-              <a:rPr lang="zh-CN" altLang="en-US" dirty="0">
-                <a:ea typeface="等线 Light"/>
-              </a:rPr>
-              <a:t>！！</a:t>
+              <a:t>Tagged Memory</a:t>
             </a:r>
             <a:endParaRPr lang="zh-CN" altLang="en-US" dirty="0"/>
           </a:p>
@@ -3762,6 +3893,249 @@
       </p:grpSpPr>
       <p:sp>
         <p:nvSpPr>
+          <p:cNvPr id="2" name="标题 1">
+            <a:extLst>
+              <a:ext uri="{FF2B5EF4-FFF2-40B4-BE49-F238E27FC236}">
+                <a16:creationId xmlns:a16="http://schemas.microsoft.com/office/drawing/2014/main" id="{CD8C2B35-7236-4B09-AB86-3EF146BBBC19}"/>
+              </a:ext>
+            </a:extLst>
+          </p:cNvPr>
+          <p:cNvSpPr>
+            <a:spLocks noGrp="1"/>
+          </p:cNvSpPr>
+          <p:nvPr>
+            <p:ph type="title"/>
+          </p:nvPr>
+        </p:nvSpPr>
+        <p:spPr/>
+        <p:txBody>
+          <a:bodyPr/>
+          <a:lstStyle/>
+          <a:p>
+            <a:r>
+              <a:rPr lang="en-US" altLang="zh-CN" dirty="0"/>
+              <a:t>Design Goals</a:t>
+            </a:r>
+            <a:endParaRPr lang="zh-CN" altLang="en-US" dirty="0"/>
+          </a:p>
+        </p:txBody>
+      </p:sp>
+      <p:sp>
+        <p:nvSpPr>
+          <p:cNvPr id="3" name="内容占位符 2">
+            <a:extLst>
+              <a:ext uri="{FF2B5EF4-FFF2-40B4-BE49-F238E27FC236}">
+                <a16:creationId xmlns:a16="http://schemas.microsoft.com/office/drawing/2014/main" id="{2B4F8F6E-0F47-423C-A04E-9ADF85EACD9E}"/>
+              </a:ext>
+            </a:extLst>
+          </p:cNvPr>
+          <p:cNvSpPr>
+            <a:spLocks noGrp="1"/>
+          </p:cNvSpPr>
+          <p:nvPr>
+            <p:ph idx="1"/>
+          </p:nvPr>
+        </p:nvSpPr>
+        <p:spPr/>
+        <p:txBody>
+          <a:bodyPr>
+            <a:normAutofit fontScale="70000" lnSpcReduction="20000"/>
+          </a:bodyPr>
+          <a:lstStyle/>
+          <a:p>
+            <a:pPr>
+              <a:lnSpc>
+                <a:spcPct val="120000"/>
+              </a:lnSpc>
+            </a:pPr>
+            <a:r>
+              <a:rPr lang="en-US" altLang="zh-CN" dirty="0"/>
+              <a:t>G1 Security</a:t>
+            </a:r>
+          </a:p>
+          <a:p>
+            <a:pPr marL="0" indent="0">
+              <a:lnSpc>
+                <a:spcPct val="120000"/>
+              </a:lnSpc>
+              <a:buNone/>
+            </a:pPr>
+            <a:r>
+              <a:rPr lang="en-US" altLang="zh-CN" dirty="0"/>
+              <a:t>	</a:t>
+            </a:r>
+            <a:r>
+              <a:rPr lang="en-US" altLang="zh-CN" sz="2500" dirty="0"/>
+              <a:t>(</a:t>
+            </a:r>
+            <a:r>
+              <a:rPr lang="en-US" altLang="zh-CN" sz="2500" dirty="0" err="1"/>
+              <a:t>i</a:t>
+            </a:r>
+            <a:r>
+              <a:rPr lang="en-US" altLang="zh-CN" sz="2500" dirty="0"/>
+              <a:t>) strong memory isolation	(ii) secure entry points</a:t>
+            </a:r>
+          </a:p>
+          <a:p>
+            <a:pPr marL="0" indent="0">
+              <a:lnSpc>
+                <a:spcPct val="120000"/>
+              </a:lnSpc>
+              <a:buNone/>
+            </a:pPr>
+            <a:r>
+              <a:rPr lang="en-US" altLang="zh-CN" sz="2500" dirty="0"/>
+              <a:t>	(iii) secure communication	(iv) attestation and sealing</a:t>
+            </a:r>
+          </a:p>
+          <a:p>
+            <a:pPr>
+              <a:lnSpc>
+                <a:spcPct val="120000"/>
+              </a:lnSpc>
+            </a:pPr>
+            <a:r>
+              <a:rPr lang="en-US" altLang="zh-CN" dirty="0"/>
+              <a:t>G2 Flexibility</a:t>
+            </a:r>
+          </a:p>
+          <a:p>
+            <a:pPr marL="457200" lvl="1" indent="0">
+              <a:lnSpc>
+                <a:spcPct val="120000"/>
+              </a:lnSpc>
+              <a:buNone/>
+            </a:pPr>
+            <a:r>
+              <a:rPr lang="en-US" altLang="zh-CN" dirty="0"/>
+              <a:t>	(</a:t>
+            </a:r>
+            <a:r>
+              <a:rPr lang="en-US" altLang="zh-CN" dirty="0" err="1"/>
+              <a:t>i</a:t>
+            </a:r>
+            <a:r>
+              <a:rPr lang="en-US" altLang="zh-CN" dirty="0"/>
+              <a:t>) fine-grained 		(ii) dynamically reconfigurable isolation boundaries</a:t>
+            </a:r>
+          </a:p>
+          <a:p>
+            <a:pPr>
+              <a:lnSpc>
+                <a:spcPct val="120000"/>
+              </a:lnSpc>
+            </a:pPr>
+            <a:r>
+              <a:rPr lang="en-US" altLang="zh-CN" dirty="0"/>
+              <a:t>G3 Compatibility</a:t>
+            </a:r>
+          </a:p>
+          <a:p>
+            <a:pPr marL="0" indent="0">
+              <a:lnSpc>
+                <a:spcPct val="120000"/>
+              </a:lnSpc>
+              <a:buNone/>
+            </a:pPr>
+            <a:r>
+              <a:rPr lang="en-US" altLang="zh-CN" dirty="0"/>
+              <a:t>	</a:t>
+            </a:r>
+            <a:r>
+              <a:rPr lang="en-US" altLang="zh-CN" sz="2400" dirty="0"/>
+              <a:t>Support existing </a:t>
+            </a:r>
+            <a:r>
+              <a:rPr lang="en-US" altLang="zh-CN" sz="2400" dirty="0" err="1"/>
+              <a:t>os</a:t>
+            </a:r>
+            <a:r>
+              <a:rPr lang="en-US" altLang="zh-CN" sz="2400" dirty="0"/>
+              <a:t> and apps without modification</a:t>
+            </a:r>
+          </a:p>
+          <a:p>
+            <a:pPr>
+              <a:lnSpc>
+                <a:spcPct val="120000"/>
+              </a:lnSpc>
+            </a:pPr>
+            <a:r>
+              <a:rPr lang="en-US" altLang="zh-CN" dirty="0"/>
+              <a:t>G4 Low Overhead</a:t>
+            </a:r>
+          </a:p>
+          <a:p>
+            <a:pPr marL="0" indent="0">
+              <a:lnSpc>
+                <a:spcPct val="120000"/>
+              </a:lnSpc>
+              <a:buNone/>
+            </a:pPr>
+            <a:r>
+              <a:rPr lang="en-US" altLang="zh-CN" dirty="0"/>
+              <a:t>	</a:t>
+            </a:r>
+            <a:r>
+              <a:rPr lang="en-US" altLang="zh-CN" sz="2400" dirty="0"/>
+              <a:t>(</a:t>
+            </a:r>
+            <a:r>
+              <a:rPr lang="en-US" altLang="zh-CN" sz="2400" dirty="0" err="1"/>
+              <a:t>i</a:t>
+            </a:r>
+            <a:r>
+              <a:rPr lang="en-US" altLang="zh-CN" sz="2400" dirty="0"/>
+              <a:t>) cost of tagged memory 	(ii) performance overhead of switching security domains</a:t>
+            </a:r>
+          </a:p>
+          <a:p>
+            <a:pPr>
+              <a:lnSpc>
+                <a:spcPct val="120000"/>
+              </a:lnSpc>
+            </a:pPr>
+            <a:r>
+              <a:rPr lang="en-US" altLang="zh-CN" dirty="0"/>
+              <a:t>G5 Real-time</a:t>
+            </a:r>
+            <a:endParaRPr lang="zh-CN" altLang="en-US" dirty="0"/>
+          </a:p>
+        </p:txBody>
+      </p:sp>
+    </p:spTree>
+    <p:extLst>
+      <p:ext uri="{BB962C8B-B14F-4D97-AF65-F5344CB8AC3E}">
+        <p14:creationId xmlns:p14="http://schemas.microsoft.com/office/powerpoint/2010/main" val="2262985119"/>
+      </p:ext>
+    </p:extLst>
+  </p:cSld>
+  <p:clrMapOvr>
+    <a:masterClrMapping/>
+  </p:clrMapOvr>
+</p:sld>
+</file>
+
+<file path=ppt/slides/slide4.xml><?xml version="1.0" encoding="utf-8"?>
+<p:sld xmlns:a="http://schemas.openxmlformats.org/drawingml/2006/main" xmlns:r="http://schemas.openxmlformats.org/officeDocument/2006/relationships" xmlns:p="http://schemas.openxmlformats.org/presentationml/2006/main">
+  <p:cSld>
+    <p:spTree>
+      <p:nvGrpSpPr>
+        <p:cNvPr id="1" name=""/>
+        <p:cNvGrpSpPr/>
+        <p:nvPr/>
+      </p:nvGrpSpPr>
+      <p:grpSpPr>
+        <a:xfrm>
+          <a:off x="0" y="0"/>
+          <a:ext cx="0" cy="0"/>
+          <a:chOff x="0" y="0"/>
+          <a:chExt cx="0" cy="0"/>
+        </a:xfrm>
+      </p:grpSpPr>
+      <p:sp>
+        <p:nvSpPr>
           <p:cNvPr id="4" name="文本框 3">
             <a:extLst>
               <a:ext uri="{FF2B5EF4-FFF2-40B4-BE49-F238E27FC236}">
@@ -3774,7 +4148,7 @@
         </p:nvSpPr>
         <p:spPr>
           <a:xfrm>
-            <a:off x="939800" y="3244334"/>
+            <a:off x="0" y="3259150"/>
             <a:ext cx="1329267" cy="369332"/>
           </a:xfrm>
           <a:prstGeom prst="rect">
@@ -3810,13 +4184,13 @@
         </p:nvSpPr>
         <p:spPr>
           <a:xfrm>
-            <a:off x="2269067" y="745067"/>
-            <a:ext cx="423333" cy="5338233"/>
+            <a:off x="1329267" y="1447800"/>
+            <a:ext cx="423333" cy="4650316"/>
           </a:xfrm>
           <a:prstGeom prst="leftBrace">
             <a:avLst>
               <a:gd name="adj1" fmla="val 154333"/>
-              <a:gd name="adj2" fmla="val 49841"/>
+              <a:gd name="adj2" fmla="val 41648"/>
             </a:avLst>
           </a:prstGeom>
         </p:spPr>
@@ -3857,7 +4231,43 @@
         </p:nvSpPr>
         <p:spPr>
           <a:xfrm>
-            <a:off x="2912533" y="973667"/>
+            <a:off x="1821602" y="1334371"/>
+            <a:ext cx="1148928" cy="369332"/>
+          </a:xfrm>
+          <a:prstGeom prst="rect">
+            <a:avLst/>
+          </a:prstGeom>
+          <a:noFill/>
+        </p:spPr>
+        <p:txBody>
+          <a:bodyPr wrap="square" rtlCol="0">
+            <a:spAutoFit/>
+          </a:bodyPr>
+          <a:lstStyle/>
+          <a:p>
+            <a:r>
+              <a:rPr lang="en-US" altLang="zh-CN" dirty="0"/>
+              <a:t>Hardware</a:t>
+            </a:r>
+            <a:endParaRPr lang="zh-CN" altLang="en-US" dirty="0"/>
+          </a:p>
+        </p:txBody>
+      </p:sp>
+      <p:sp>
+        <p:nvSpPr>
+          <p:cNvPr id="7" name="文本框 6">
+            <a:extLst>
+              <a:ext uri="{FF2B5EF4-FFF2-40B4-BE49-F238E27FC236}">
+                <a16:creationId xmlns:a16="http://schemas.microsoft.com/office/drawing/2014/main" id="{190FB00E-B36D-4834-AECF-DEAC74272CC9}"/>
+              </a:ext>
+            </a:extLst>
+          </p:cNvPr>
+          <p:cNvSpPr txBox="1"/>
+          <p:nvPr/>
+        </p:nvSpPr>
+        <p:spPr>
+          <a:xfrm>
+            <a:off x="2108199" y="5001683"/>
             <a:ext cx="1202267" cy="369332"/>
           </a:xfrm>
           <a:prstGeom prst="rect">
@@ -3872,8 +4282,8 @@
           <a:lstStyle/>
           <a:p>
             <a:r>
-              <a:rPr lang="en-US" altLang="zh-CN" dirty="0"/>
-              <a:t>Hardware</a:t>
+              <a:rPr lang="en-US" altLang="zh-CN"/>
+              <a:t>Software</a:t>
             </a:r>
             <a:endParaRPr lang="zh-CN" altLang="en-US" dirty="0"/>
           </a:p>
@@ -3881,10 +4291,57 @@
       </p:sp>
       <p:sp>
         <p:nvSpPr>
-          <p:cNvPr id="7" name="文本框 6">
-            <a:extLst>
-              <a:ext uri="{FF2B5EF4-FFF2-40B4-BE49-F238E27FC236}">
-                <a16:creationId xmlns:a16="http://schemas.microsoft.com/office/drawing/2014/main" id="{190FB00E-B36D-4834-AECF-DEAC74272CC9}"/>
+          <p:cNvPr id="8" name="左大括号 7">
+            <a:extLst>
+              <a:ext uri="{FF2B5EF4-FFF2-40B4-BE49-F238E27FC236}">
+                <a16:creationId xmlns:a16="http://schemas.microsoft.com/office/drawing/2014/main" id="{427CFD1E-EF76-407E-A643-90804EDC230D}"/>
+              </a:ext>
+            </a:extLst>
+          </p:cNvPr>
+          <p:cNvSpPr/>
+          <p:nvPr/>
+        </p:nvSpPr>
+        <p:spPr>
+          <a:xfrm>
+            <a:off x="3050116" y="759882"/>
+            <a:ext cx="204894" cy="1876637"/>
+          </a:xfrm>
+          <a:prstGeom prst="leftBrace">
+            <a:avLst>
+              <a:gd name="adj1" fmla="val 154333"/>
+              <a:gd name="adj2" fmla="val 38972"/>
+            </a:avLst>
+          </a:prstGeom>
+        </p:spPr>
+        <p:style>
+          <a:lnRef idx="3">
+            <a:schemeClr val="dk1"/>
+          </a:lnRef>
+          <a:fillRef idx="0">
+            <a:schemeClr val="dk1"/>
+          </a:fillRef>
+          <a:effectRef idx="2">
+            <a:schemeClr val="dk1"/>
+          </a:effectRef>
+          <a:fontRef idx="minor">
+            <a:schemeClr val="tx1"/>
+          </a:fontRef>
+        </p:style>
+        <p:txBody>
+          <a:bodyPr rtlCol="0" anchor="ctr"/>
+          <a:lstStyle/>
+          <a:p>
+            <a:pPr algn="ctr"/>
+            <a:endParaRPr lang="zh-CN" altLang="en-US"/>
+          </a:p>
+        </p:txBody>
+      </p:sp>
+      <p:sp>
+        <p:nvSpPr>
+          <p:cNvPr id="3" name="文本框 2">
+            <a:extLst>
+              <a:ext uri="{FF2B5EF4-FFF2-40B4-BE49-F238E27FC236}">
+                <a16:creationId xmlns:a16="http://schemas.microsoft.com/office/drawing/2014/main" id="{B3025546-DE5E-4A37-8338-C9DA955E2C39}"/>
               </a:ext>
             </a:extLst>
           </p:cNvPr>
@@ -3893,8 +4350,8 @@
         </p:nvSpPr>
         <p:spPr>
           <a:xfrm>
-            <a:off x="3047999" y="4986867"/>
-            <a:ext cx="1202267" cy="369332"/>
+            <a:off x="3464560" y="235796"/>
+            <a:ext cx="1333500" cy="369332"/>
           </a:xfrm>
           <a:prstGeom prst="rect">
             <a:avLst/>
@@ -3907,9 +4364,160 @@
           </a:bodyPr>
           <a:lstStyle/>
           <a:p>
-            <a:r>
-              <a:rPr lang="en-US" altLang="zh-CN"/>
-              <a:t>Software</a:t>
+            <a:endParaRPr lang="zh-CN" altLang="en-US" dirty="0"/>
+          </a:p>
+        </p:txBody>
+      </p:sp>
+      <p:sp>
+        <p:nvSpPr>
+          <p:cNvPr id="9" name="文本框 8">
+            <a:extLst>
+              <a:ext uri="{FF2B5EF4-FFF2-40B4-BE49-F238E27FC236}">
+                <a16:creationId xmlns:a16="http://schemas.microsoft.com/office/drawing/2014/main" id="{72063762-0460-4A5A-9D9C-EDFCEE9B33A5}"/>
+              </a:ext>
+            </a:extLst>
+          </p:cNvPr>
+          <p:cNvSpPr txBox="1"/>
+          <p:nvPr/>
+        </p:nvSpPr>
+        <p:spPr>
+          <a:xfrm>
+            <a:off x="3293533" y="575216"/>
+            <a:ext cx="1836420" cy="369332"/>
+          </a:xfrm>
+          <a:prstGeom prst="rect">
+            <a:avLst/>
+          </a:prstGeom>
+          <a:noFill/>
+        </p:spPr>
+        <p:txBody>
+          <a:bodyPr wrap="square" rtlCol="0">
+            <a:spAutoFit/>
+          </a:bodyPr>
+          <a:lstStyle/>
+          <a:p>
+            <a:r>
+              <a:rPr lang="en-US" altLang="zh-CN" dirty="0"/>
+              <a:t>Tagged Memory</a:t>
+            </a:r>
+            <a:endParaRPr lang="zh-CN" altLang="en-US" dirty="0"/>
+          </a:p>
+        </p:txBody>
+      </p:sp>
+      <p:sp>
+        <p:nvSpPr>
+          <p:cNvPr id="10" name="文本框 9">
+            <a:extLst>
+              <a:ext uri="{FF2B5EF4-FFF2-40B4-BE49-F238E27FC236}">
+                <a16:creationId xmlns:a16="http://schemas.microsoft.com/office/drawing/2014/main" id="{E9D3E8BA-BDC9-4BBA-8D62-9E7BC0C8A7DF}"/>
+              </a:ext>
+            </a:extLst>
+          </p:cNvPr>
+          <p:cNvSpPr txBox="1"/>
+          <p:nvPr/>
+        </p:nvSpPr>
+        <p:spPr>
+          <a:xfrm>
+            <a:off x="3310466" y="2446681"/>
+            <a:ext cx="2484120" cy="369332"/>
+          </a:xfrm>
+          <a:prstGeom prst="rect">
+            <a:avLst/>
+          </a:prstGeom>
+          <a:noFill/>
+        </p:spPr>
+        <p:txBody>
+          <a:bodyPr wrap="square" rtlCol="0">
+            <a:spAutoFit/>
+          </a:bodyPr>
+          <a:lstStyle/>
+          <a:p>
+            <a:r>
+              <a:rPr lang="en-US" altLang="zh-CN" dirty="0"/>
+              <a:t>Memory Protected Unit</a:t>
+            </a:r>
+            <a:endParaRPr lang="zh-CN" altLang="en-US" dirty="0"/>
+          </a:p>
+        </p:txBody>
+      </p:sp>
+      <p:sp>
+        <p:nvSpPr>
+          <p:cNvPr id="11" name="左大括号 10">
+            <a:extLst>
+              <a:ext uri="{FF2B5EF4-FFF2-40B4-BE49-F238E27FC236}">
+                <a16:creationId xmlns:a16="http://schemas.microsoft.com/office/drawing/2014/main" id="{AF805E00-5A50-4960-AF47-4249F6E75D5A}"/>
+              </a:ext>
+            </a:extLst>
+          </p:cNvPr>
+          <p:cNvSpPr/>
+          <p:nvPr/>
+        </p:nvSpPr>
+        <p:spPr>
+          <a:xfrm>
+            <a:off x="5193452" y="125468"/>
+            <a:ext cx="204894" cy="1638160"/>
+          </a:xfrm>
+          <a:prstGeom prst="leftBrace">
+            <a:avLst>
+              <a:gd name="adj1" fmla="val 154333"/>
+              <a:gd name="adj2" fmla="val 44980"/>
+            </a:avLst>
+          </a:prstGeom>
+        </p:spPr>
+        <p:style>
+          <a:lnRef idx="3">
+            <a:schemeClr val="dk1"/>
+          </a:lnRef>
+          <a:fillRef idx="0">
+            <a:schemeClr val="dk1"/>
+          </a:fillRef>
+          <a:effectRef idx="2">
+            <a:schemeClr val="dk1"/>
+          </a:effectRef>
+          <a:fontRef idx="minor">
+            <a:schemeClr val="tx1"/>
+          </a:fontRef>
+        </p:style>
+        <p:txBody>
+          <a:bodyPr rtlCol="0" anchor="ctr"/>
+          <a:lstStyle/>
+          <a:p>
+            <a:pPr algn="ctr"/>
+            <a:endParaRPr lang="zh-CN" altLang="en-US"/>
+          </a:p>
+        </p:txBody>
+      </p:sp>
+      <p:sp>
+        <p:nvSpPr>
+          <p:cNvPr id="12" name="文本框 11">
+            <a:extLst>
+              <a:ext uri="{FF2B5EF4-FFF2-40B4-BE49-F238E27FC236}">
+                <a16:creationId xmlns:a16="http://schemas.microsoft.com/office/drawing/2014/main" id="{C0A84DB8-4D11-4745-833E-1D2D42037304}"/>
+              </a:ext>
+            </a:extLst>
+          </p:cNvPr>
+          <p:cNvSpPr txBox="1"/>
+          <p:nvPr/>
+        </p:nvSpPr>
+        <p:spPr>
+          <a:xfrm>
+            <a:off x="5461845" y="0"/>
+            <a:ext cx="2232660" cy="369332"/>
+          </a:xfrm>
+          <a:prstGeom prst="rect">
+            <a:avLst/>
+          </a:prstGeom>
+          <a:noFill/>
+        </p:spPr>
+        <p:txBody>
+          <a:bodyPr wrap="square" rtlCol="0">
+            <a:spAutoFit/>
+          </a:bodyPr>
+          <a:lstStyle/>
+          <a:p>
+            <a:r>
+              <a:rPr lang="en-US" altLang="zh-CN" dirty="0"/>
+              <a:t>Tagged Instruction</a:t>
             </a:r>
             <a:endParaRPr lang="zh-CN" altLang="en-US" dirty="0"/>
           </a:p>
@@ -3928,7 +4536,7 @@
 </p:sld>
 </file>
 
-<file path=ppt/slides/slide4.xml><?xml version="1.0" encoding="utf-8"?>
+<file path=ppt/slides/slide5.xml><?xml version="1.0" encoding="utf-8"?>
 <p:sld xmlns:a="http://schemas.openxmlformats.org/drawingml/2006/main" xmlns:r="http://schemas.openxmlformats.org/officeDocument/2006/relationships" xmlns:p="http://schemas.openxmlformats.org/presentationml/2006/main">
   <p:cSld>
     <p:spTree>

</xml_diff>